<commit_message>
layout stuff and content
</commit_message>
<xml_diff>
--- a/presentations/video-6-presentation.pptx
+++ b/presentations/video-6-presentation.pptx
@@ -279,7 +279,7 @@
           <a:p>
             <a:fld id="{FCBBF114-0AC3-9842-A95C-BF0E4929108C}" type="datetimeFigureOut">
               <a:rPr lang="fi-FI" smtClean="0"/>
-              <a:t>30.12.2019</a:t>
+              <a:t>26.3.2020</a:t>
             </a:fld>
             <a:endParaRPr lang="fi-FI" dirty="0"/>
           </a:p>
@@ -477,7 +477,7 @@
           <a:p>
             <a:fld id="{FCBBF114-0AC3-9842-A95C-BF0E4929108C}" type="datetimeFigureOut">
               <a:rPr lang="fi-FI" smtClean="0"/>
-              <a:t>30.12.2019</a:t>
+              <a:t>26.3.2020</a:t>
             </a:fld>
             <a:endParaRPr lang="fi-FI" dirty="0"/>
           </a:p>
@@ -685,7 +685,7 @@
           <a:p>
             <a:fld id="{FCBBF114-0AC3-9842-A95C-BF0E4929108C}" type="datetimeFigureOut">
               <a:rPr lang="fi-FI" smtClean="0"/>
-              <a:t>30.12.2019</a:t>
+              <a:t>26.3.2020</a:t>
             </a:fld>
             <a:endParaRPr lang="fi-FI" dirty="0"/>
           </a:p>
@@ -883,7 +883,7 @@
           <a:p>
             <a:fld id="{FCBBF114-0AC3-9842-A95C-BF0E4929108C}" type="datetimeFigureOut">
               <a:rPr lang="fi-FI" smtClean="0"/>
-              <a:t>30.12.2019</a:t>
+              <a:t>26.3.2020</a:t>
             </a:fld>
             <a:endParaRPr lang="fi-FI" dirty="0"/>
           </a:p>
@@ -1158,7 +1158,7 @@
           <a:p>
             <a:fld id="{FCBBF114-0AC3-9842-A95C-BF0E4929108C}" type="datetimeFigureOut">
               <a:rPr lang="fi-FI" smtClean="0"/>
-              <a:t>30.12.2019</a:t>
+              <a:t>26.3.2020</a:t>
             </a:fld>
             <a:endParaRPr lang="fi-FI" dirty="0"/>
           </a:p>
@@ -1423,7 +1423,7 @@
           <a:p>
             <a:fld id="{FCBBF114-0AC3-9842-A95C-BF0E4929108C}" type="datetimeFigureOut">
               <a:rPr lang="fi-FI" smtClean="0"/>
-              <a:t>30.12.2019</a:t>
+              <a:t>26.3.2020</a:t>
             </a:fld>
             <a:endParaRPr lang="fi-FI" dirty="0"/>
           </a:p>
@@ -1835,7 +1835,7 @@
           <a:p>
             <a:fld id="{FCBBF114-0AC3-9842-A95C-BF0E4929108C}" type="datetimeFigureOut">
               <a:rPr lang="fi-FI" smtClean="0"/>
-              <a:t>30.12.2019</a:t>
+              <a:t>26.3.2020</a:t>
             </a:fld>
             <a:endParaRPr lang="fi-FI" dirty="0"/>
           </a:p>
@@ -1976,7 +1976,7 @@
           <a:p>
             <a:fld id="{FCBBF114-0AC3-9842-A95C-BF0E4929108C}" type="datetimeFigureOut">
               <a:rPr lang="fi-FI" smtClean="0"/>
-              <a:t>30.12.2019</a:t>
+              <a:t>26.3.2020</a:t>
             </a:fld>
             <a:endParaRPr lang="fi-FI" dirty="0"/>
           </a:p>
@@ -2089,7 +2089,7 @@
           <a:p>
             <a:fld id="{FCBBF114-0AC3-9842-A95C-BF0E4929108C}" type="datetimeFigureOut">
               <a:rPr lang="fi-FI" smtClean="0"/>
-              <a:t>30.12.2019</a:t>
+              <a:t>26.3.2020</a:t>
             </a:fld>
             <a:endParaRPr lang="fi-FI" dirty="0"/>
           </a:p>
@@ -2400,7 +2400,7 @@
           <a:p>
             <a:fld id="{FCBBF114-0AC3-9842-A95C-BF0E4929108C}" type="datetimeFigureOut">
               <a:rPr lang="fi-FI" smtClean="0"/>
-              <a:t>30.12.2019</a:t>
+              <a:t>26.3.2020</a:t>
             </a:fld>
             <a:endParaRPr lang="fi-FI" dirty="0"/>
           </a:p>
@@ -2688,7 +2688,7 @@
           <a:p>
             <a:fld id="{FCBBF114-0AC3-9842-A95C-BF0E4929108C}" type="datetimeFigureOut">
               <a:rPr lang="fi-FI" smtClean="0"/>
-              <a:t>30.12.2019</a:t>
+              <a:t>26.3.2020</a:t>
             </a:fld>
             <a:endParaRPr lang="fi-FI" dirty="0"/>
           </a:p>
@@ -2929,7 +2929,7 @@
           <a:p>
             <a:fld id="{FCBBF114-0AC3-9842-A95C-BF0E4929108C}" type="datetimeFigureOut">
               <a:rPr lang="fi-FI" smtClean="0"/>
-              <a:t>30.12.2019</a:t>
+              <a:t>26.3.2020</a:t>
             </a:fld>
             <a:endParaRPr lang="fi-FI" dirty="0"/>
           </a:p>
@@ -12221,39 +12221,6 @@
           </a:p>
         </p:txBody>
       </p:sp>
-      <p:pic>
-        <p:nvPicPr>
-          <p:cNvPr id="8" name="Kuva 7">
-            <a:extLst>
-              <a:ext uri="{FF2B5EF4-FFF2-40B4-BE49-F238E27FC236}">
-                <a16:creationId xmlns:a16="http://schemas.microsoft.com/office/drawing/2014/main" id="{963E941E-DC3D-C548-AA0B-0759E12BE642}"/>
-              </a:ext>
-            </a:extLst>
-          </p:cNvPr>
-          <p:cNvPicPr>
-            <a:picLocks noChangeAspect="1"/>
-          </p:cNvPicPr>
-          <p:nvPr/>
-        </p:nvPicPr>
-        <p:blipFill>
-          <a:blip r:embed="rId2"/>
-          <a:stretch>
-            <a:fillRect/>
-          </a:stretch>
-        </p:blipFill>
-        <p:spPr>
-          <a:xfrm>
-            <a:off x="6056814" y="346944"/>
-            <a:ext cx="5960189" cy="3061939"/>
-          </a:xfrm>
-          <a:prstGeom prst="rect">
-            <a:avLst/>
-          </a:prstGeom>
-          <a:ln>
-            <a:noFill/>
-          </a:ln>
-        </p:spPr>
-      </p:pic>
       <p:sp>
         <p:nvSpPr>
           <p:cNvPr id="10" name="Suorakulmio 9">
@@ -12269,7 +12236,7 @@
         <p:spPr>
           <a:xfrm>
             <a:off x="6310183" y="3540513"/>
-            <a:ext cx="5276336" cy="2246769"/>
+            <a:ext cx="5276336" cy="1815882"/>
           </a:xfrm>
           <a:prstGeom prst="rect">
             <a:avLst/>
@@ -12283,62 +12250,62 @@
           <a:p>
             <a:pPr algn="ctr"/>
             <a:r>
-              <a:rPr lang="fi-FI" sz="2800" dirty="0" err="1">
-                <a:solidFill>
-                  <a:schemeClr val="bg1"/>
-                </a:solidFill>
-              </a:rPr>
-              <a:t>Economics</a:t>
-            </a:r>
-            <a:r>
-              <a:rPr lang="fi-FI" sz="2800" dirty="0">
-                <a:solidFill>
-                  <a:schemeClr val="bg1"/>
-                </a:solidFill>
-              </a:rPr>
-              <a:t> of </a:t>
-            </a:r>
-            <a:r>
-              <a:rPr lang="fi-FI" sz="2800" dirty="0" err="1">
-                <a:solidFill>
-                  <a:schemeClr val="bg1"/>
-                </a:solidFill>
-              </a:rPr>
-              <a:t>the</a:t>
-            </a:r>
-            <a:r>
-              <a:rPr lang="fi-FI" sz="2800" dirty="0">
-                <a:solidFill>
-                  <a:schemeClr val="bg1"/>
-                </a:solidFill>
-              </a:rPr>
-              <a:t> </a:t>
-            </a:r>
-            <a:r>
-              <a:rPr lang="fi-FI" sz="2800" dirty="0" err="1">
-                <a:solidFill>
-                  <a:schemeClr val="bg1"/>
-                </a:solidFill>
-              </a:rPr>
-              <a:t>Developer</a:t>
-            </a:r>
-            <a:r>
-              <a:rPr lang="fi-FI" sz="2800" dirty="0">
-                <a:solidFill>
-                  <a:schemeClr val="bg1"/>
-                </a:solidFill>
-              </a:rPr>
-              <a:t> </a:t>
-            </a:r>
-            <a:r>
-              <a:rPr lang="fi-FI" sz="2800" dirty="0" err="1">
-                <a:solidFill>
-                  <a:schemeClr val="bg1"/>
-                </a:solidFill>
-              </a:rPr>
-              <a:t>eXperience</a:t>
-            </a:r>
-            <a:endParaRPr lang="fi-FI" sz="2800" dirty="0">
+              <a:rPr lang="fi-FI" sz="2800" b="1" dirty="0" err="1">
+                <a:solidFill>
+                  <a:schemeClr val="bg1"/>
+                </a:solidFill>
+              </a:rPr>
+              <a:t>Executive</a:t>
+            </a:r>
+            <a:r>
+              <a:rPr lang="fi-FI" sz="2800" b="1" dirty="0">
+                <a:solidFill>
+                  <a:schemeClr val="bg1"/>
+                </a:solidFill>
+              </a:rPr>
+              <a:t> </a:t>
+            </a:r>
+            <a:r>
+              <a:rPr lang="fi-FI" sz="2800" b="1" dirty="0" err="1">
+                <a:solidFill>
+                  <a:schemeClr val="bg1"/>
+                </a:solidFill>
+              </a:rPr>
+              <a:t>level</a:t>
+            </a:r>
+            <a:r>
+              <a:rPr lang="fi-FI" sz="2800" b="1" dirty="0">
+                <a:solidFill>
+                  <a:schemeClr val="bg1"/>
+                </a:solidFill>
+              </a:rPr>
+              <a:t> </a:t>
+            </a:r>
+            <a:r>
+              <a:rPr lang="fi-FI" sz="2800" b="1" dirty="0" err="1">
+                <a:solidFill>
+                  <a:schemeClr val="bg1"/>
+                </a:solidFill>
+              </a:rPr>
+              <a:t>coaching</a:t>
+            </a:r>
+            <a:r>
+              <a:rPr lang="fi-FI" sz="2800" b="1" dirty="0">
+                <a:solidFill>
+                  <a:schemeClr val="bg1"/>
+                </a:solidFill>
+              </a:rPr>
+              <a:t> </a:t>
+            </a:r>
+            <a:r>
+              <a:rPr lang="fi-FI" sz="2800" b="1" dirty="0" err="1">
+                <a:solidFill>
+                  <a:schemeClr val="bg1"/>
+                </a:solidFill>
+              </a:rPr>
+              <a:t>packages</a:t>
+            </a:r>
+            <a:endParaRPr lang="fi-FI" sz="2800" b="1" dirty="0">
               <a:solidFill>
                 <a:schemeClr val="bg1"/>
               </a:solidFill>
@@ -12346,7 +12313,7 @@
           </a:p>
           <a:p>
             <a:pPr algn="ctr"/>
-            <a:endParaRPr lang="fi-FI" sz="2800" dirty="0">
+            <a:endParaRPr lang="fi-FI" sz="2800" b="1" dirty="0">
               <a:solidFill>
                 <a:schemeClr val="bg1"/>
               </a:solidFill>
@@ -12355,78 +12322,46 @@
           <a:p>
             <a:pPr algn="ctr"/>
             <a:r>
-              <a:rPr lang="fi-FI" sz="2800" dirty="0" err="1">
-                <a:solidFill>
-                  <a:schemeClr val="bg1"/>
-                </a:solidFill>
-              </a:rPr>
-              <a:t>Why</a:t>
-            </a:r>
-            <a:r>
-              <a:rPr lang="fi-FI" sz="2800" dirty="0">
-                <a:solidFill>
-                  <a:schemeClr val="bg1"/>
-                </a:solidFill>
-              </a:rPr>
-              <a:t> DX </a:t>
-            </a:r>
-            <a:r>
-              <a:rPr lang="fi-FI" sz="2800" dirty="0" err="1">
-                <a:solidFill>
-                  <a:schemeClr val="bg1"/>
-                </a:solidFill>
-              </a:rPr>
-              <a:t>matters</a:t>
-            </a:r>
-            <a:r>
-              <a:rPr lang="fi-FI" sz="2800" dirty="0">
-                <a:solidFill>
-                  <a:schemeClr val="bg1"/>
-                </a:solidFill>
-              </a:rPr>
-              <a:t> in </a:t>
-            </a:r>
-            <a:r>
-              <a:rPr lang="fi-FI" sz="2800" dirty="0" err="1">
-                <a:solidFill>
-                  <a:schemeClr val="bg1"/>
-                </a:solidFill>
-              </a:rPr>
-              <a:t>product</a:t>
-            </a:r>
-            <a:r>
-              <a:rPr lang="fi-FI" sz="2800" dirty="0">
-                <a:solidFill>
-                  <a:schemeClr val="bg1"/>
-                </a:solidFill>
-              </a:rPr>
-              <a:t> </a:t>
-            </a:r>
-            <a:r>
-              <a:rPr lang="fi-FI" sz="2800" dirty="0" err="1">
-                <a:solidFill>
-                  <a:schemeClr val="bg1"/>
-                </a:solidFill>
-              </a:rPr>
-              <a:t>development</a:t>
-            </a:r>
-            <a:r>
-              <a:rPr lang="fi-FI" sz="2800" dirty="0">
-                <a:solidFill>
-                  <a:schemeClr val="bg1"/>
-                </a:solidFill>
-              </a:rPr>
-              <a:t> and </a:t>
-            </a:r>
-            <a:r>
-              <a:rPr lang="fi-FI" sz="2800" dirty="0" err="1">
-                <a:solidFill>
-                  <a:schemeClr val="bg1"/>
-                </a:solidFill>
-              </a:rPr>
-              <a:t>sales</a:t>
-            </a:r>
-            <a:endParaRPr lang="fi-FI" sz="2800" dirty="0">
+              <a:rPr lang="fi-FI" sz="2800" b="1" dirty="0">
+                <a:solidFill>
+                  <a:schemeClr val="bg1"/>
+                </a:solidFill>
+              </a:rPr>
+              <a:t>3 </a:t>
+            </a:r>
+            <a:r>
+              <a:rPr lang="fi-FI" sz="2800" b="1" dirty="0" err="1">
+                <a:solidFill>
+                  <a:schemeClr val="bg1"/>
+                </a:solidFill>
+              </a:rPr>
+              <a:t>packages</a:t>
+            </a:r>
+            <a:endParaRPr lang="fi-FI" sz="2800" b="1" dirty="0">
+              <a:solidFill>
+                <a:schemeClr val="bg1"/>
+              </a:solidFill>
+            </a:endParaRPr>
+          </a:p>
+          <a:p>
+            <a:pPr algn="ctr"/>
+            <a:r>
+              <a:rPr lang="fi-FI" sz="2800" b="1" dirty="0">
+                <a:solidFill>
+                  <a:schemeClr val="bg1"/>
+                </a:solidFill>
+              </a:rPr>
+              <a:t>26 Online video </a:t>
+            </a:r>
+            <a:r>
+              <a:rPr lang="fi-FI" sz="2800" b="1" dirty="0" err="1">
+                <a:solidFill>
+                  <a:schemeClr val="bg1"/>
+                </a:solidFill>
+              </a:rPr>
+              <a:t>episodes</a:t>
+            </a:r>
+            <a:endParaRPr lang="fi-FI" sz="2800" b="1" dirty="0">
               <a:solidFill>
                 <a:schemeClr val="bg1"/>
               </a:solidFill>
@@ -12656,6 +12591,115 @@
                 </a:solidFill>
               </a:rPr>
               <a:t>.</a:t>
+            </a:r>
+          </a:p>
+        </p:txBody>
+      </p:sp>
+      <p:pic>
+        <p:nvPicPr>
+          <p:cNvPr id="1026" name="Picture 2" descr="DX Doctor Services Logo">
+            <a:extLst>
+              <a:ext uri="{FF2B5EF4-FFF2-40B4-BE49-F238E27FC236}">
+                <a16:creationId xmlns:a16="http://schemas.microsoft.com/office/drawing/2014/main" id="{452CF528-A3C6-A549-BBD9-1F148D524BBA}"/>
+              </a:ext>
+            </a:extLst>
+          </p:cNvPr>
+          <p:cNvPicPr>
+            <a:picLocks noChangeAspect="1" noChangeArrowheads="1"/>
+          </p:cNvPicPr>
+          <p:nvPr/>
+        </p:nvPicPr>
+        <p:blipFill>
+          <a:blip r:embed="rId2">
+            <a:extLst>
+              <a:ext uri="{28A0092B-C50C-407E-A947-70E740481C1C}">
+                <a14:useLocalDpi xmlns:a14="http://schemas.microsoft.com/office/drawing/2010/main" val="0"/>
+              </a:ext>
+            </a:extLst>
+          </a:blip>
+          <a:srcRect/>
+          <a:stretch>
+            <a:fillRect/>
+          </a:stretch>
+        </p:blipFill>
+        <p:spPr bwMode="auto">
+          <a:xfrm>
+            <a:off x="6219285" y="208936"/>
+            <a:ext cx="5635247" cy="2784987"/>
+          </a:xfrm>
+          <a:prstGeom prst="rect">
+            <a:avLst/>
+          </a:prstGeom>
+          <a:noFill/>
+          <a:extLst>
+            <a:ext uri="{909E8E84-426E-40DD-AFC4-6F175D3DCCD1}">
+              <a14:hiddenFill xmlns:a14="http://schemas.microsoft.com/office/drawing/2010/main">
+                <a:solidFill>
+                  <a:srgbClr val="FFFFFF"/>
+                </a:solidFill>
+              </a14:hiddenFill>
+            </a:ext>
+          </a:extLst>
+        </p:spPr>
+      </p:pic>
+      <p:sp>
+        <p:nvSpPr>
+          <p:cNvPr id="3" name="Suorakulmio 2">
+            <a:extLst>
+              <a:ext uri="{FF2B5EF4-FFF2-40B4-BE49-F238E27FC236}">
+                <a16:creationId xmlns:a16="http://schemas.microsoft.com/office/drawing/2014/main" id="{3ED7AAD1-91BA-814B-A1CB-7891377D6761}"/>
+              </a:ext>
+            </a:extLst>
+          </p:cNvPr>
+          <p:cNvSpPr/>
+          <p:nvPr/>
+        </p:nvSpPr>
+        <p:spPr>
+          <a:xfrm>
+            <a:off x="7454352" y="5672152"/>
+            <a:ext cx="2987997" cy="461665"/>
+          </a:xfrm>
+          <a:prstGeom prst="rect">
+            <a:avLst/>
+          </a:prstGeom>
+        </p:spPr>
+        <p:txBody>
+          <a:bodyPr wrap="none">
+            <a:spAutoFit/>
+          </a:bodyPr>
+          <a:lstStyle/>
+          <a:p>
+            <a:r>
+              <a:rPr lang="fi-FI" sz="2400" dirty="0" err="1">
+                <a:solidFill>
+                  <a:schemeClr val="bg1"/>
+                </a:solidFill>
+              </a:rPr>
+              <a:t>dxdoctor.net</a:t>
+            </a:r>
+            <a:r>
+              <a:rPr lang="fi-FI" sz="2400" dirty="0">
+                <a:solidFill>
+                  <a:schemeClr val="bg1"/>
+                </a:solidFill>
+              </a:rPr>
+              <a:t>/</a:t>
+            </a:r>
+            <a:r>
+              <a:rPr lang="fi-FI" sz="2400" dirty="0" err="1">
+                <a:solidFill>
+                  <a:schemeClr val="bg1"/>
+                </a:solidFill>
+              </a:rPr>
+              <a:t>services</a:t>
+            </a:r>
+            <a:r>
+              <a:rPr lang="fi-FI" sz="2400" dirty="0">
+                <a:solidFill>
+                  <a:schemeClr val="bg1"/>
+                </a:solidFill>
+              </a:rPr>
+              <a:t>/</a:t>
             </a:r>
           </a:p>
         </p:txBody>
@@ -12732,7 +12776,7 @@
                   <a:schemeClr val="bg1"/>
                 </a:solidFill>
               </a:rPr>
-              <a:t>What</a:t>
+              <a:t>Conway's</a:t>
             </a:r>
             <a:r>
               <a:rPr lang="fi-FI" b="1" dirty="0">
@@ -12748,7 +12792,7 @@
                   <a:schemeClr val="bg1"/>
                 </a:solidFill>
               </a:rPr>
-              <a:t>Kahneman's</a:t>
+              <a:t>law</a:t>
             </a:r>
             <a:r>
               <a:rPr lang="fi-FI" b="1" dirty="0">
@@ -12756,7 +12800,7 @@
                   <a:schemeClr val="bg1"/>
                 </a:solidFill>
               </a:rPr>
-              <a:t> </a:t>
+              <a:t> and </a:t>
             </a:r>
             <a:r>
               <a:rPr lang="fi-FI" b="1" dirty="0" err="1">
@@ -12764,7 +12808,7 @@
                   <a:schemeClr val="bg1"/>
                 </a:solidFill>
               </a:rPr>
-              <a:t>system</a:t>
+              <a:t>Developer</a:t>
             </a:r>
             <a:r>
               <a:rPr lang="fi-FI" b="1" dirty="0">
@@ -12780,96 +12824,13 @@
                   <a:schemeClr val="bg1"/>
                 </a:solidFill>
               </a:rPr>
-              <a:t>theory</a:t>
-            </a:r>
-            <a:r>
-              <a:rPr lang="fi-FI" b="1" dirty="0">
-                <a:solidFill>
-                  <a:schemeClr val="bg1"/>
-                </a:solidFill>
-              </a:rPr>
-              <a:t> </a:t>
-            </a:r>
-            <a:r>
-              <a:rPr lang="fi-FI" b="1" dirty="0" err="1">
-                <a:solidFill>
-                  <a:schemeClr val="bg1"/>
-                </a:solidFill>
-              </a:rPr>
-              <a:t>has</a:t>
-            </a:r>
-            <a:r>
-              <a:rPr lang="fi-FI" b="1" dirty="0">
-                <a:solidFill>
-                  <a:schemeClr val="bg1"/>
-                </a:solidFill>
-              </a:rPr>
-              <a:t> to </a:t>
-            </a:r>
-            <a:r>
-              <a:rPr lang="fi-FI" b="1" dirty="0" err="1">
-                <a:solidFill>
-                  <a:schemeClr val="bg1"/>
-                </a:solidFill>
-              </a:rPr>
-              <a:t>do</a:t>
-            </a:r>
-            <a:r>
-              <a:rPr lang="fi-FI" b="1" dirty="0">
-                <a:solidFill>
-                  <a:schemeClr val="bg1"/>
-                </a:solidFill>
-              </a:rPr>
-              <a:t> </a:t>
-            </a:r>
-            <a:r>
-              <a:rPr lang="fi-FI" b="1" dirty="0" err="1">
-                <a:solidFill>
-                  <a:schemeClr val="bg1"/>
-                </a:solidFill>
-              </a:rPr>
-              <a:t>with</a:t>
-            </a:r>
-            <a:r>
-              <a:rPr lang="fi-FI" b="1" dirty="0">
-                <a:solidFill>
-                  <a:schemeClr val="bg1"/>
-                </a:solidFill>
-              </a:rPr>
-              <a:t> </a:t>
-            </a:r>
-            <a:r>
-              <a:rPr lang="fi-FI" b="1" dirty="0" err="1">
-                <a:solidFill>
-                  <a:schemeClr val="bg1"/>
-                </a:solidFill>
-              </a:rPr>
-              <a:t>Developer</a:t>
-            </a:r>
-            <a:r>
-              <a:rPr lang="fi-FI" b="1" dirty="0">
-                <a:solidFill>
-                  <a:schemeClr val="bg1"/>
-                </a:solidFill>
-              </a:rPr>
-              <a:t> </a:t>
-            </a:r>
-            <a:r>
-              <a:rPr lang="fi-FI" b="1" dirty="0" err="1">
-                <a:solidFill>
-                  <a:schemeClr val="bg1"/>
-                </a:solidFill>
-              </a:rPr>
               <a:t>eXperience</a:t>
             </a:r>
-            <a:r>
-              <a:rPr lang="fi-FI" b="1" dirty="0">
-                <a:solidFill>
-                  <a:schemeClr val="bg1"/>
-                </a:solidFill>
-              </a:rPr>
-              <a:t>?</a:t>
-            </a:r>
+            <a:endParaRPr lang="fi-FI" b="1" dirty="0">
+              <a:solidFill>
+                <a:schemeClr val="bg1"/>
+              </a:solidFill>
+            </a:endParaRPr>
           </a:p>
         </p:txBody>
       </p:sp>

</xml_diff>